<commit_message>
add file word dan diagram baru tgl 09/06/2023
</commit_message>
<xml_diff>
--- a/fix2/PPT - Persada Konveksi.pptx
+++ b/fix2/PPT - Persada Konveksi.pptx
@@ -331,7 +331,7 @@
             <a:fld id="{AC9BA84F-BAFC-4251-8168-572C91B5EBAD}" type="datetimeFigureOut">
               <a:rPr lang="en-ID" smtClean="0"/>
               <a:pPr/>
-              <a:t>14/10/2022</a:t>
+              <a:t>23/11/2022</a:t>
             </a:fld>
             <a:endParaRPr lang="en-ID" dirty="0"/>
           </a:p>
@@ -2021,7 +2021,7 @@
             </a:r>
             <a:r>
               <a:rPr lang="en-US" dirty="0" err="1"/>
-              <a:t>urutan</a:t>
+              <a:t>pemodelan</a:t>
             </a:r>
             <a:r>
               <a:rPr lang="en-US" dirty="0"/>
@@ -2029,55 +2029,47 @@
             </a:r>
             <a:r>
               <a:rPr lang="en-US" dirty="0" err="1"/>
-              <a:t>kegiatan</a:t>
-            </a:r>
-            <a:r>
-              <a:rPr lang="en-US" baseline="0" dirty="0"/>
+              <a:t>untuk</a:t>
+            </a:r>
+            <a:r>
+              <a:rPr lang="en-US" dirty="0"/>
+              <a:t> </a:t>
+            </a:r>
+            <a:r>
+              <a:rPr lang="en-US" dirty="0" err="1"/>
+              <a:t>melakukan</a:t>
+            </a:r>
+            <a:r>
+              <a:rPr lang="en-US" dirty="0"/>
+              <a:t> behavior pada </a:t>
+            </a:r>
+            <a:r>
+              <a:rPr lang="en-US" dirty="0" err="1"/>
+              <a:t>sistem</a:t>
+            </a:r>
+            <a:r>
+              <a:rPr lang="en-US" dirty="0"/>
+              <a:t> </a:t>
+            </a:r>
+            <a:r>
+              <a:rPr lang="en-US" dirty="0" err="1"/>
+              <a:t>informasi</a:t>
+            </a:r>
+            <a:r>
+              <a:rPr lang="en-US" dirty="0"/>
               <a:t> yang </a:t>
             </a:r>
             <a:r>
-              <a:rPr lang="en-US" baseline="0" dirty="0" err="1"/>
-              <a:t>dilakukan</a:t>
-            </a:r>
-            <a:r>
-              <a:rPr lang="en-US" baseline="0" dirty="0"/>
-              <a:t> actor dan </a:t>
-            </a:r>
-            <a:r>
-              <a:rPr lang="en-US" baseline="0" dirty="0" err="1"/>
-              <a:t>sistem</a:t>
-            </a:r>
-            <a:r>
-              <a:rPr lang="en-US" baseline="0" dirty="0"/>
-              <a:t> </a:t>
-            </a:r>
-            <a:r>
-              <a:rPr lang="en-US" baseline="0" dirty="0" err="1"/>
-              <a:t>untuk</a:t>
-            </a:r>
-            <a:r>
-              <a:rPr lang="en-US" baseline="0" dirty="0"/>
-              <a:t> </a:t>
-            </a:r>
-            <a:r>
-              <a:rPr lang="en-US" baseline="0" dirty="0" err="1"/>
-              <a:t>mencapai</a:t>
-            </a:r>
-            <a:r>
-              <a:rPr lang="en-US" baseline="0" dirty="0"/>
-              <a:t> </a:t>
-            </a:r>
-            <a:r>
-              <a:rPr lang="en-US" baseline="0" dirty="0" err="1"/>
-              <a:t>tujuan</a:t>
-            </a:r>
-            <a:r>
-              <a:rPr lang="en-US" baseline="0" dirty="0"/>
-              <a:t> </a:t>
-            </a:r>
-            <a:r>
-              <a:rPr lang="en-US" baseline="0" dirty="0" err="1"/>
-              <a:t>tertentu</a:t>
+              <a:rPr lang="en-US" dirty="0" err="1"/>
+              <a:t>akan</a:t>
+            </a:r>
+            <a:r>
+              <a:rPr lang="en-US" dirty="0"/>
+              <a:t> </a:t>
+            </a:r>
+            <a:r>
+              <a:rPr lang="en-US" dirty="0" err="1"/>
+              <a:t>dibuat</a:t>
             </a:r>
             <a:endParaRPr lang="en-US" baseline="0" dirty="0"/>
           </a:p>
@@ -2088,19 +2080,19 @@
             </a:r>
             <a:r>
               <a:rPr lang="en-US" baseline="0" dirty="0"/>
-              <a:t>: diagram </a:t>
+              <a:t>: </a:t>
             </a:r>
             <a:r>
               <a:rPr lang="en-US" baseline="0" dirty="0" err="1"/>
-              <a:t>urutan</a:t>
+              <a:t>menggambarkan</a:t>
             </a:r>
             <a:r>
               <a:rPr lang="en-US" baseline="0" dirty="0"/>
-              <a:t> yang </a:t>
+              <a:t> </a:t>
             </a:r>
             <a:r>
               <a:rPr lang="en-US" baseline="0" dirty="0" err="1"/>
-              <a:t>menunjukkan</a:t>
+              <a:t>kelakuan</a:t>
             </a:r>
             <a:r>
               <a:rPr lang="en-US" baseline="0" dirty="0"/>
@@ -2108,15 +2100,15 @@
             </a:r>
             <a:r>
               <a:rPr lang="en-US" baseline="0" dirty="0" err="1"/>
-              <a:t>interaksi</a:t>
+              <a:t>objek</a:t>
             </a:r>
             <a:r>
               <a:rPr lang="en-US" baseline="0" dirty="0"/>
-              <a:t> proses yang </a:t>
+              <a:t> pada use case </a:t>
             </a:r>
             <a:r>
               <a:rPr lang="en-US" baseline="0" dirty="0" err="1"/>
-              <a:t>diatur</a:t>
+              <a:t>dengan</a:t>
             </a:r>
             <a:r>
               <a:rPr lang="en-US" baseline="0" dirty="0"/>
@@ -2124,15 +2116,7 @@
             </a:r>
             <a:r>
               <a:rPr lang="en-US" baseline="0" dirty="0" err="1"/>
-              <a:t>dalam</a:t>
-            </a:r>
-            <a:r>
-              <a:rPr lang="en-US" baseline="0" dirty="0"/>
-              <a:t> </a:t>
-            </a:r>
-            <a:r>
-              <a:rPr lang="en-US" baseline="0" dirty="0" err="1"/>
-              <a:t>urutan</a:t>
+              <a:t>mendiskripsikan</a:t>
             </a:r>
             <a:r>
               <a:rPr lang="en-US" baseline="0" dirty="0"/>
@@ -2141,6 +2125,46 @@
             <a:r>
               <a:rPr lang="en-US" baseline="0" dirty="0" err="1"/>
               <a:t>waktu</a:t>
+            </a:r>
+            <a:r>
+              <a:rPr lang="en-US" baseline="0" dirty="0"/>
+              <a:t> </a:t>
+            </a:r>
+            <a:r>
+              <a:rPr lang="en-US" baseline="0" dirty="0" err="1"/>
+              <a:t>hidup</a:t>
+            </a:r>
+            <a:r>
+              <a:rPr lang="en-US" baseline="0" dirty="0"/>
+              <a:t> dan message yang </a:t>
+            </a:r>
+            <a:r>
+              <a:rPr lang="en-US" baseline="0" dirty="0" err="1"/>
+              <a:t>dikirimkan</a:t>
+            </a:r>
+            <a:r>
+              <a:rPr lang="en-US" baseline="0" dirty="0"/>
+              <a:t> dan </a:t>
+            </a:r>
+            <a:r>
+              <a:rPr lang="en-US" baseline="0" dirty="0" err="1"/>
+              <a:t>diterima</a:t>
+            </a:r>
+            <a:r>
+              <a:rPr lang="en-US" baseline="0" dirty="0"/>
+              <a:t> </a:t>
+            </a:r>
+            <a:r>
+              <a:rPr lang="en-US" baseline="0" dirty="0" err="1"/>
+              <a:t>antar</a:t>
+            </a:r>
+            <a:r>
+              <a:rPr lang="en-US" baseline="0" dirty="0"/>
+              <a:t> </a:t>
+            </a:r>
+            <a:r>
+              <a:rPr lang="en-US" baseline="0" dirty="0" err="1"/>
+              <a:t>objek</a:t>
             </a:r>
             <a:endParaRPr lang="en-US" baseline="0" dirty="0"/>
           </a:p>
@@ -2210,23 +2234,7 @@
             </a:r>
             <a:r>
               <a:rPr lang="en-US" baseline="0" dirty="0" err="1"/>
-              <a:t>kelas</a:t>
-            </a:r>
-            <a:r>
-              <a:rPr lang="en-US" baseline="0" dirty="0"/>
-              <a:t>” </a:t>
-            </a:r>
-            <a:r>
-              <a:rPr lang="en-US" baseline="0" dirty="0" err="1"/>
-              <a:t>dalam</a:t>
-            </a:r>
-            <a:r>
-              <a:rPr lang="en-US" baseline="0" dirty="0"/>
-              <a:t> </a:t>
-            </a:r>
-            <a:r>
-              <a:rPr lang="en-US" baseline="0" dirty="0" err="1"/>
-              <a:t>sebuah</a:t>
+              <a:t>struktur</a:t>
             </a:r>
             <a:r>
               <a:rPr lang="en-US" baseline="0" dirty="0"/>
@@ -2238,11 +2246,11 @@
             </a:r>
             <a:r>
               <a:rPr lang="en-US" baseline="0" dirty="0"/>
-              <a:t> dan </a:t>
+              <a:t> </a:t>
             </a:r>
             <a:r>
               <a:rPr lang="en-US" baseline="0" dirty="0" err="1"/>
-              <a:t>hubungan</a:t>
+              <a:t>dari</a:t>
             </a:r>
             <a:r>
               <a:rPr lang="en-US" baseline="0" dirty="0"/>
@@ -2250,7 +2258,7 @@
             </a:r>
             <a:r>
               <a:rPr lang="en-US" baseline="0" dirty="0" err="1"/>
-              <a:t>antara</a:t>
+              <a:t>segi</a:t>
             </a:r>
             <a:r>
               <a:rPr lang="en-US" baseline="0" dirty="0"/>
@@ -2258,7 +2266,7 @@
             </a:r>
             <a:r>
               <a:rPr lang="en-US" baseline="0" dirty="0" err="1"/>
-              <a:t>satu</a:t>
+              <a:t>pendefinisian</a:t>
             </a:r>
             <a:r>
               <a:rPr lang="en-US" baseline="0" dirty="0"/>
@@ -2266,11 +2274,55 @@
             </a:r>
             <a:r>
               <a:rPr lang="en-US" baseline="0" dirty="0" err="1"/>
-              <a:t>dengan</a:t>
+              <a:t>kelas</a:t>
             </a:r>
             <a:r>
               <a:rPr lang="en-US" baseline="0" dirty="0"/>
-              <a:t> yang lain</a:t>
+              <a:t> </a:t>
+            </a:r>
+            <a:r>
+              <a:rPr lang="en-US" baseline="0" dirty="0" err="1"/>
+              <a:t>kelas</a:t>
+            </a:r>
+            <a:r>
+              <a:rPr lang="en-US" baseline="0" dirty="0"/>
+              <a:t> yang </a:t>
+            </a:r>
+            <a:r>
+              <a:rPr lang="en-US" baseline="0" dirty="0" err="1"/>
+              <a:t>akan</a:t>
+            </a:r>
+            <a:r>
+              <a:rPr lang="en-US" baseline="0" dirty="0"/>
+              <a:t> </a:t>
+            </a:r>
+            <a:r>
+              <a:rPr lang="en-US" baseline="0" dirty="0" err="1"/>
+              <a:t>dibuat</a:t>
+            </a:r>
+            <a:r>
+              <a:rPr lang="en-US" baseline="0" dirty="0"/>
+              <a:t> </a:t>
+            </a:r>
+            <a:r>
+              <a:rPr lang="en-US" baseline="0" dirty="0" err="1"/>
+              <a:t>untuk</a:t>
+            </a:r>
+            <a:r>
+              <a:rPr lang="en-US" baseline="0" dirty="0"/>
+              <a:t> </a:t>
+            </a:r>
+            <a:r>
+              <a:rPr lang="en-US" baseline="0" dirty="0" err="1"/>
+              <a:t>membangun</a:t>
+            </a:r>
+            <a:r>
+              <a:rPr lang="en-US" baseline="0" dirty="0"/>
+              <a:t> </a:t>
+            </a:r>
+            <a:r>
+              <a:rPr lang="en-US" baseline="0" dirty="0" err="1"/>
+              <a:t>sistem</a:t>
             </a:r>
             <a:endParaRPr lang="en-US" dirty="0"/>
           </a:p>
@@ -2589,7 +2641,7 @@
             <a:fld id="{E724E3CD-E581-41CD-84DB-8446017278B7}" type="datetimeFigureOut">
               <a:rPr lang="en-ID" smtClean="0"/>
               <a:pPr/>
-              <a:t>14/10/2022</a:t>
+              <a:t>23/11/2022</a:t>
             </a:fld>
             <a:endParaRPr lang="en-ID" dirty="0"/>
           </a:p>
@@ -2881,7 +2933,7 @@
             <a:fld id="{E724E3CD-E581-41CD-84DB-8446017278B7}" type="datetimeFigureOut">
               <a:rPr lang="en-ID" smtClean="0"/>
               <a:pPr/>
-              <a:t>14/10/2022</a:t>
+              <a:t>23/11/2022</a:t>
             </a:fld>
             <a:endParaRPr lang="en-ID" dirty="0"/>
           </a:p>
@@ -4136,7 +4188,7 @@
             <a:fld id="{E724E3CD-E581-41CD-84DB-8446017278B7}" type="datetimeFigureOut">
               <a:rPr lang="en-ID" smtClean="0"/>
               <a:pPr/>
-              <a:t>14/10/2022</a:t>
+              <a:t>23/11/2022</a:t>
             </a:fld>
             <a:endParaRPr lang="en-ID" dirty="0"/>
           </a:p>
@@ -4520,7 +4572,7 @@
             <a:fld id="{E724E3CD-E581-41CD-84DB-8446017278B7}" type="datetimeFigureOut">
               <a:rPr lang="en-ID" smtClean="0"/>
               <a:pPr/>
-              <a:t>14/10/2022</a:t>
+              <a:t>23/11/2022</a:t>
             </a:fld>
             <a:endParaRPr lang="en-ID" dirty="0"/>
           </a:p>
@@ -5056,7 +5108,7 @@
             <a:fld id="{E724E3CD-E581-41CD-84DB-8446017278B7}" type="datetimeFigureOut">
               <a:rPr lang="en-ID" smtClean="0"/>
               <a:pPr/>
-              <a:t>14/10/2022</a:t>
+              <a:t>23/11/2022</a:t>
             </a:fld>
             <a:endParaRPr lang="en-ID" dirty="0"/>
           </a:p>
@@ -5256,7 +5308,7 @@
             <a:fld id="{E724E3CD-E581-41CD-84DB-8446017278B7}" type="datetimeFigureOut">
               <a:rPr lang="en-ID" smtClean="0"/>
               <a:pPr/>
-              <a:t>14/10/2022</a:t>
+              <a:t>23/11/2022</a:t>
             </a:fld>
             <a:endParaRPr lang="en-ID" dirty="0"/>
           </a:p>
@@ -5413,7 +5465,7 @@
             <a:fld id="{E724E3CD-E581-41CD-84DB-8446017278B7}" type="datetimeFigureOut">
               <a:rPr lang="en-ID" smtClean="0"/>
               <a:pPr/>
-              <a:t>14/10/2022</a:t>
+              <a:t>23/11/2022</a:t>
             </a:fld>
             <a:endParaRPr lang="en-ID" dirty="0"/>
           </a:p>
@@ -5793,7 +5845,7 @@
             <a:fld id="{E724E3CD-E581-41CD-84DB-8446017278B7}" type="datetimeFigureOut">
               <a:rPr lang="en-ID" smtClean="0"/>
               <a:pPr/>
-              <a:t>14/10/2022</a:t>
+              <a:t>23/11/2022</a:t>
             </a:fld>
             <a:endParaRPr lang="en-ID" dirty="0"/>
           </a:p>
@@ -6141,7 +6193,7 @@
             <a:fld id="{E724E3CD-E581-41CD-84DB-8446017278B7}" type="datetimeFigureOut">
               <a:rPr lang="en-ID" smtClean="0"/>
               <a:pPr/>
-              <a:t>14/10/2022</a:t>
+              <a:t>23/11/2022</a:t>
             </a:fld>
             <a:endParaRPr lang="en-ID" dirty="0"/>
           </a:p>
@@ -14377,7 +14429,7 @@
         </p:nvSpPr>
         <p:spPr>
           <a:xfrm>
-            <a:off x="6194534" y="4128214"/>
+            <a:off x="4638324" y="4100188"/>
             <a:ext cx="3253354" cy="1100682"/>
           </a:xfrm>
           <a:prstGeom prst="roundRect">
@@ -14446,7 +14498,7 @@
         </p:nvGrpSpPr>
         <p:grpSpPr>
           <a:xfrm>
-            <a:off x="7601220" y="5008906"/>
+            <a:off x="5923516" y="5008904"/>
             <a:ext cx="439980" cy="439980"/>
             <a:chOff x="10588945" y="961090"/>
             <a:chExt cx="439980" cy="439980"/>
@@ -14578,7 +14630,7 @@
         </p:nvSpPr>
         <p:spPr>
           <a:xfrm>
-            <a:off x="6554374" y="4399115"/>
+            <a:off x="4840457" y="4419697"/>
             <a:ext cx="2614270" cy="461665"/>
           </a:xfrm>
           <a:prstGeom prst="rect">
@@ -14646,7 +14698,7 @@
         </p:nvSpPr>
         <p:spPr>
           <a:xfrm>
-            <a:off x="2781410" y="4128215"/>
+            <a:off x="1212448" y="4128213"/>
             <a:ext cx="3253354" cy="1100681"/>
           </a:xfrm>
           <a:prstGeom prst="roundRect">
@@ -14715,7 +14767,7 @@
         </p:nvGrpSpPr>
         <p:grpSpPr>
           <a:xfrm>
-            <a:off x="4188096" y="5079582"/>
+            <a:off x="2511182" y="5016333"/>
             <a:ext cx="439980" cy="439980"/>
             <a:chOff x="10588945" y="961090"/>
             <a:chExt cx="439980" cy="439980"/>
@@ -14847,7 +14899,7 @@
         </p:nvSpPr>
         <p:spPr>
           <a:xfrm>
-            <a:off x="3100951" y="4457442"/>
+            <a:off x="1569085" y="4447722"/>
             <a:ext cx="2614270" cy="461665"/>
           </a:xfrm>
           <a:prstGeom prst="rect">
@@ -14924,7 +14976,7 @@
         </p:nvSpPr>
         <p:spPr>
           <a:xfrm>
-            <a:off x="4469323" y="1954114"/>
+            <a:off x="4603091" y="1918394"/>
             <a:ext cx="3253354" cy="1100682"/>
           </a:xfrm>
           <a:prstGeom prst="roundRect">
@@ -14993,7 +15045,7 @@
         </p:nvGrpSpPr>
         <p:grpSpPr>
           <a:xfrm>
-            <a:off x="5825021" y="2880261"/>
+            <a:off x="5927602" y="2814159"/>
             <a:ext cx="439980" cy="439980"/>
             <a:chOff x="10588945" y="961090"/>
             <a:chExt cx="439980" cy="439980"/>
@@ -15125,7 +15177,7 @@
         </p:nvSpPr>
         <p:spPr>
           <a:xfrm>
-            <a:off x="4669392" y="2239641"/>
+            <a:off x="4762861" y="2238349"/>
             <a:ext cx="2933813" cy="461665"/>
           </a:xfrm>
           <a:prstGeom prst="rect">
@@ -15768,6 +15820,222 @@
           </a:p>
         </p:txBody>
       </p:sp>
+      <p:sp>
+        <p:nvSpPr>
+          <p:cNvPr id="28" name="Rectangle: Rounded Corners 27">
+            <a:extLst>
+              <a:ext uri="{FF2B5EF4-FFF2-40B4-BE49-F238E27FC236}">
+                <a16:creationId xmlns:a16="http://schemas.microsoft.com/office/drawing/2014/main" id="{EB7EA0A3-D3DF-46D7-84CF-F05B42DA4816}"/>
+              </a:ext>
+            </a:extLst>
+          </p:cNvPr>
+          <p:cNvSpPr/>
+          <p:nvPr/>
+        </p:nvSpPr>
+        <p:spPr>
+          <a:xfrm>
+            <a:off x="8093811" y="4128212"/>
+            <a:ext cx="3253354" cy="1100682"/>
+          </a:xfrm>
+          <a:prstGeom prst="roundRect">
+            <a:avLst>
+              <a:gd name="adj" fmla="val 5016"/>
+            </a:avLst>
+          </a:prstGeom>
+          <a:solidFill>
+            <a:schemeClr val="bg1"/>
+          </a:solidFill>
+          <a:ln>
+            <a:noFill/>
+          </a:ln>
+          <a:effectLst>
+            <a:outerShdw blurRad="635000" dist="114300" dir="5400000" algn="t" rotWithShape="0">
+              <a:prstClr val="black">
+                <a:alpha val="15000"/>
+              </a:prstClr>
+            </a:outerShdw>
+          </a:effectLst>
+        </p:spPr>
+        <p:style>
+          <a:lnRef idx="2">
+            <a:schemeClr val="accent1">
+              <a:shade val="50000"/>
+            </a:schemeClr>
+          </a:lnRef>
+          <a:fillRef idx="1">
+            <a:schemeClr val="accent1"/>
+          </a:fillRef>
+          <a:effectRef idx="0">
+            <a:schemeClr val="accent1"/>
+          </a:effectRef>
+          <a:fontRef idx="minor">
+            <a:schemeClr val="lt1"/>
+          </a:fontRef>
+        </p:style>
+        <p:txBody>
+          <a:bodyPr rtlCol="0" anchor="ctr"/>
+          <a:lstStyle/>
+          <a:p>
+            <a:pPr algn="ctr"/>
+            <a:r>
+              <a:rPr lang="en-ID" sz="2400" b="1" dirty="0" err="1">
+                <a:solidFill>
+                  <a:schemeClr val="tx1">
+                    <a:lumMod val="95000"/>
+                    <a:lumOff val="5000"/>
+                  </a:schemeClr>
+                </a:solidFill>
+                <a:latin typeface="Vidaloka " panose="02000504000000020004"/>
+              </a:rPr>
+              <a:t>Bisnis</a:t>
+            </a:r>
+            <a:r>
+              <a:rPr lang="en-ID" sz="2400" b="1" dirty="0">
+                <a:solidFill>
+                  <a:schemeClr val="tx1">
+                    <a:lumMod val="95000"/>
+                    <a:lumOff val="5000"/>
+                  </a:schemeClr>
+                </a:solidFill>
+                <a:latin typeface="Vidaloka " panose="02000504000000020004"/>
+              </a:rPr>
+              <a:t> Proses</a:t>
+            </a:r>
+          </a:p>
+        </p:txBody>
+      </p:sp>
+      <p:grpSp>
+        <p:nvGrpSpPr>
+          <p:cNvPr id="29" name="Group 28">
+            <a:extLst>
+              <a:ext uri="{FF2B5EF4-FFF2-40B4-BE49-F238E27FC236}">
+                <a16:creationId xmlns:a16="http://schemas.microsoft.com/office/drawing/2014/main" id="{ED846CC4-9AD7-45FC-BCA6-F3423000CBFA}"/>
+              </a:ext>
+            </a:extLst>
+          </p:cNvPr>
+          <p:cNvGrpSpPr/>
+          <p:nvPr/>
+        </p:nvGrpSpPr>
+        <p:grpSpPr>
+          <a:xfrm>
+            <a:off x="9447888" y="5107155"/>
+            <a:ext cx="456022" cy="439980"/>
+            <a:chOff x="10588945" y="961090"/>
+            <a:chExt cx="456022" cy="439980"/>
+          </a:xfrm>
+        </p:grpSpPr>
+        <p:sp>
+          <p:nvSpPr>
+            <p:cNvPr id="30" name="Oval 29">
+              <a:extLst>
+                <a:ext uri="{FF2B5EF4-FFF2-40B4-BE49-F238E27FC236}">
+                  <a16:creationId xmlns:a16="http://schemas.microsoft.com/office/drawing/2014/main" id="{3C6F92B9-497F-4047-9044-6A54AEF936A7}"/>
+                </a:ext>
+              </a:extLst>
+            </p:cNvPr>
+            <p:cNvSpPr/>
+            <p:nvPr/>
+          </p:nvSpPr>
+          <p:spPr>
+            <a:xfrm>
+              <a:off x="10588945" y="961090"/>
+              <a:ext cx="439980" cy="439980"/>
+            </a:xfrm>
+            <a:prstGeom prst="ellipse">
+              <a:avLst/>
+            </a:prstGeom>
+            <a:solidFill>
+              <a:schemeClr val="accent1"/>
+            </a:solidFill>
+            <a:ln>
+              <a:noFill/>
+            </a:ln>
+            <a:effectLst>
+              <a:outerShdw blurRad="635000" dist="114300" dir="5400000" algn="t" rotWithShape="0">
+                <a:prstClr val="black">
+                  <a:alpha val="15000"/>
+                </a:prstClr>
+              </a:outerShdw>
+            </a:effectLst>
+          </p:spPr>
+          <p:style>
+            <a:lnRef idx="2">
+              <a:schemeClr val="accent1">
+                <a:shade val="50000"/>
+              </a:schemeClr>
+            </a:lnRef>
+            <a:fillRef idx="1">
+              <a:schemeClr val="accent1"/>
+            </a:fillRef>
+            <a:effectRef idx="0">
+              <a:schemeClr val="accent1"/>
+            </a:effectRef>
+            <a:fontRef idx="minor">
+              <a:schemeClr val="lt1"/>
+            </a:fontRef>
+          </p:style>
+          <p:txBody>
+            <a:bodyPr rtlCol="0" anchor="ctr"/>
+            <a:lstStyle/>
+            <a:p>
+              <a:pPr algn="ctr"/>
+              <a:endParaRPr lang="en-ID" sz="1000" dirty="0">
+                <a:solidFill>
+                  <a:schemeClr val="bg1"/>
+                </a:solidFill>
+                <a:latin typeface="Vidaloka " panose="02000504000000020004" pitchFamily="50" charset="0"/>
+              </a:endParaRPr>
+            </a:p>
+          </p:txBody>
+        </p:sp>
+        <p:sp>
+          <p:nvSpPr>
+            <p:cNvPr id="31" name="TextBox 30">
+              <a:extLst>
+                <a:ext uri="{FF2B5EF4-FFF2-40B4-BE49-F238E27FC236}">
+                  <a16:creationId xmlns:a16="http://schemas.microsoft.com/office/drawing/2014/main" id="{41B42DCF-752A-4300-BAF4-24560D9C2FF1}"/>
+                </a:ext>
+              </a:extLst>
+            </p:cNvPr>
+            <p:cNvSpPr txBox="1"/>
+            <p:nvPr/>
+          </p:nvSpPr>
+          <p:spPr>
+            <a:xfrm>
+              <a:off x="10604987" y="1027192"/>
+              <a:ext cx="439980" cy="307777"/>
+            </a:xfrm>
+            <a:prstGeom prst="rect">
+              <a:avLst/>
+            </a:prstGeom>
+            <a:noFill/>
+          </p:spPr>
+          <p:txBody>
+            <a:bodyPr wrap="square" rtlCol="0">
+              <a:spAutoFit/>
+            </a:bodyPr>
+            <a:lstStyle/>
+            <a:p>
+              <a:pPr algn="ctr"/>
+              <a:r>
+                <a:rPr lang="en-US" sz="1400" dirty="0">
+                  <a:solidFill>
+                    <a:schemeClr val="bg1"/>
+                  </a:solidFill>
+                  <a:latin typeface="Vidaloka " panose="02000504000000020004" pitchFamily="50" charset="0"/>
+                </a:rPr>
+                <a:t>06</a:t>
+              </a:r>
+              <a:endParaRPr lang="en-ID" sz="1400" dirty="0">
+                <a:solidFill>
+                  <a:schemeClr val="bg1"/>
+                </a:solidFill>
+                <a:latin typeface="Vidaloka " panose="02000504000000020004" pitchFamily="50" charset="0"/>
+              </a:endParaRPr>
+            </a:p>
+          </p:txBody>
+        </p:sp>
+      </p:grpSp>
     </p:spTree>
     <p:extLst>
       <p:ext uri="{BB962C8B-B14F-4D97-AF65-F5344CB8AC3E}">
@@ -16043,7 +16311,7 @@
                   </a:solidFill>
                   <a:latin typeface="Vidaloka " panose="02000504000000020004" pitchFamily="50" charset="0"/>
                 </a:rPr>
-                <a:t>10</a:t>
+                <a:t>11</a:t>
               </a:r>
               <a:endParaRPr lang="en-ID" sz="1400" dirty="0">
                 <a:solidFill>
@@ -16244,7 +16512,7 @@
                   </a:solidFill>
                   <a:latin typeface="Vidaloka " panose="02000504000000020004" pitchFamily="50" charset="0"/>
                 </a:rPr>
-                <a:t>11</a:t>
+                <a:t>12</a:t>
               </a:r>
               <a:endParaRPr lang="en-ID" sz="1400" dirty="0">
                 <a:solidFill>
@@ -16513,7 +16781,7 @@
                   </a:solidFill>
                   <a:latin typeface="Vidaloka " panose="02000504000000020004" pitchFamily="50" charset="0"/>
                 </a:rPr>
-                <a:t>09</a:t>
+                <a:t>10</a:t>
               </a:r>
               <a:endParaRPr lang="en-ID" sz="1400" dirty="0">
                 <a:solidFill>
@@ -16714,7 +16982,7 @@
                   </a:solidFill>
                   <a:latin typeface="Vidaloka " panose="02000504000000020004" pitchFamily="50" charset="0"/>
                 </a:rPr>
-                <a:t>07</a:t>
+                <a:t>08</a:t>
               </a:r>
             </a:p>
           </p:txBody>
@@ -16986,7 +17254,7 @@
                   </a:solidFill>
                   <a:latin typeface="Vidaloka " panose="02000504000000020004" pitchFamily="50" charset="0"/>
                 </a:rPr>
-                <a:t>08</a:t>
+                <a:t>09</a:t>
               </a:r>
             </a:p>
           </p:txBody>
@@ -17258,7 +17526,7 @@
                   </a:solidFill>
                   <a:latin typeface="Vidaloka " panose="02000504000000020004" pitchFamily="50" charset="0"/>
                 </a:rPr>
-                <a:t>06</a:t>
+                <a:t>07</a:t>
               </a:r>
               <a:endParaRPr lang="en-ID" sz="1400" dirty="0">
                 <a:solidFill>

</xml_diff>